<commit_message>
Added delta for mouthDetection Perfomance in camshift
</commit_message>
<xml_diff>
--- a/Presentacion/doc/EMOTICONIZER.pptx
+++ b/Presentacion/doc/EMOTICONIZER.pptx
@@ -6,16 +6,18 @@
   </p:sldMasterIdLst>
   <p:sldIdLst>
     <p:sldId id="256" r:id="rId2"/>
-    <p:sldId id="265" r:id="rId3"/>
-    <p:sldId id="258" r:id="rId4"/>
-    <p:sldId id="264" r:id="rId5"/>
-    <p:sldId id="262" r:id="rId6"/>
+    <p:sldId id="268" r:id="rId3"/>
+    <p:sldId id="265" r:id="rId4"/>
+    <p:sldId id="258" r:id="rId5"/>
+    <p:sldId id="264" r:id="rId6"/>
     <p:sldId id="260" r:id="rId7"/>
-    <p:sldId id="266" r:id="rId8"/>
-    <p:sldId id="263" r:id="rId9"/>
-    <p:sldId id="267" r:id="rId10"/>
-    <p:sldId id="257" r:id="rId11"/>
-    <p:sldId id="261" r:id="rId12"/>
+    <p:sldId id="262" r:id="rId8"/>
+    <p:sldId id="266" r:id="rId9"/>
+    <p:sldId id="263" r:id="rId10"/>
+    <p:sldId id="269" r:id="rId11"/>
+    <p:sldId id="267" r:id="rId12"/>
+    <p:sldId id="257" r:id="rId13"/>
+    <p:sldId id="261" r:id="rId14"/>
   </p:sldIdLst>
   <p:sldSz cx="9144000" cy="6858000" type="screen4x3"/>
   <p:notesSz cx="6858000" cy="9144000"/>
@@ -4207,30 +4209,14 @@
             <a:pPr algn="ctr"/>
             <a:r>
               <a:rPr lang="es-ES" dirty="0" smtClean="0"/>
-              <a:t>INSTRUMENTACION </a:t>
-            </a:r>
+              <a:t>INSTRUMENTACION PARA LA VISION</a:t>
+            </a:r>
+          </a:p>
+          <a:p>
+            <a:pPr algn="ctr"/>
             <a:r>
               <a:rPr lang="es-ES" dirty="0" smtClean="0"/>
-              <a:t>PARA LA </a:t>
-            </a:r>
-            <a:r>
-              <a:rPr lang="es-ES" dirty="0" smtClean="0"/>
-              <a:t>VISION</a:t>
-            </a:r>
-          </a:p>
-          <a:p>
-            <a:pPr algn="ctr"/>
-            <a:r>
-              <a:rPr lang="es-ES" dirty="0" smtClean="0"/>
-              <a:t>ORION </a:t>
-            </a:r>
-            <a:r>
-              <a:rPr lang="es-ES" dirty="0" smtClean="0"/>
-              <a:t>GARCÍA </a:t>
-            </a:r>
-            <a:r>
-              <a:rPr lang="es-ES" dirty="0" smtClean="0"/>
-              <a:t>GALLARDO</a:t>
+              <a:t>ORION GARCÍA GALLARDO</a:t>
             </a:r>
           </a:p>
           <a:p>
@@ -4307,6 +4293,169 @@
         </p:nvSpPr>
         <p:spPr/>
         <p:txBody>
+          <a:bodyPr/>
+          <a:lstStyle/>
+          <a:p>
+            <a:r>
+              <a:rPr lang="es-ES" dirty="0" smtClean="0"/>
+              <a:t>Tracking </a:t>
+            </a:r>
+            <a:r>
+              <a:rPr lang="es-ES" dirty="0" err="1" smtClean="0"/>
+              <a:t>Mouth</a:t>
+            </a:r>
+            <a:endParaRPr lang="es-ES" dirty="0"/>
+          </a:p>
+        </p:txBody>
+      </p:sp>
+      <p:sp>
+        <p:nvSpPr>
+          <p:cNvPr id="3" name="Content Placeholder 2"/>
+          <p:cNvSpPr>
+            <a:spLocks noGrp="1"/>
+          </p:cNvSpPr>
+          <p:nvPr>
+            <p:ph idx="1"/>
+          </p:nvPr>
+        </p:nvSpPr>
+        <p:spPr/>
+        <p:txBody>
+          <a:bodyPr/>
+          <a:lstStyle/>
+          <a:p>
+            <a:endParaRPr lang="es-ES"/>
+          </a:p>
+        </p:txBody>
+      </p:sp>
+    </p:spTree>
+    <p:extLst>
+      <p:ext uri="{BB962C8B-B14F-4D97-AF65-F5344CB8AC3E}">
+        <p14:creationId xmlns:p14="http://schemas.microsoft.com/office/powerpoint/2010/main" val="2221060687"/>
+      </p:ext>
+    </p:extLst>
+  </p:cSld>
+  <p:clrMapOvr>
+    <a:masterClrMapping/>
+  </p:clrMapOvr>
+</p:sld>
+</file>
+
+<file path=ppt/slides/slide11.xml><?xml version="1.0" encoding="utf-8"?>
+<p:sld xmlns:a="http://schemas.openxmlformats.org/drawingml/2006/main" xmlns:r="http://schemas.openxmlformats.org/officeDocument/2006/relationships" xmlns:p="http://schemas.openxmlformats.org/presentationml/2006/main">
+  <p:cSld>
+    <p:spTree>
+      <p:nvGrpSpPr>
+        <p:cNvPr id="1" name=""/>
+        <p:cNvGrpSpPr/>
+        <p:nvPr/>
+      </p:nvGrpSpPr>
+      <p:grpSpPr>
+        <a:xfrm>
+          <a:off x="0" y="0"/>
+          <a:ext cx="0" cy="0"/>
+          <a:chOff x="0" y="0"/>
+          <a:chExt cx="0" cy="0"/>
+        </a:xfrm>
+      </p:grpSpPr>
+      <p:sp>
+        <p:nvSpPr>
+          <p:cNvPr id="2" name="Title 1"/>
+          <p:cNvSpPr>
+            <a:spLocks noGrp="1"/>
+          </p:cNvSpPr>
+          <p:nvPr>
+            <p:ph type="title"/>
+          </p:nvPr>
+        </p:nvSpPr>
+        <p:spPr/>
+        <p:txBody>
+          <a:bodyPr/>
+          <a:lstStyle/>
+          <a:p>
+            <a:r>
+              <a:rPr lang="es-ES" dirty="0" err="1" smtClean="0"/>
+              <a:t>Eye</a:t>
+            </a:r>
+            <a:r>
+              <a:rPr lang="es-ES" dirty="0" smtClean="0"/>
+              <a:t> </a:t>
+            </a:r>
+            <a:r>
+              <a:rPr lang="es-ES" dirty="0" err="1" smtClean="0"/>
+              <a:t>Camshift</a:t>
+            </a:r>
+            <a:endParaRPr lang="es-ES" dirty="0"/>
+          </a:p>
+        </p:txBody>
+      </p:sp>
+      <p:sp>
+        <p:nvSpPr>
+          <p:cNvPr id="3" name="Content Placeholder 2"/>
+          <p:cNvSpPr>
+            <a:spLocks noGrp="1"/>
+          </p:cNvSpPr>
+          <p:nvPr>
+            <p:ph idx="1"/>
+          </p:nvPr>
+        </p:nvSpPr>
+        <p:spPr/>
+        <p:txBody>
+          <a:bodyPr/>
+          <a:lstStyle/>
+          <a:p>
+            <a:endParaRPr lang="es-ES"/>
+          </a:p>
+        </p:txBody>
+      </p:sp>
+    </p:spTree>
+    <p:extLst>
+      <p:ext uri="{BB962C8B-B14F-4D97-AF65-F5344CB8AC3E}">
+        <p14:creationId xmlns:p14="http://schemas.microsoft.com/office/powerpoint/2010/main" val="1976494236"/>
+      </p:ext>
+    </p:extLst>
+  </p:cSld>
+  <p:clrMapOvr>
+    <a:masterClrMapping/>
+  </p:clrMapOvr>
+  <p:timing>
+    <p:tnLst>
+      <p:par>
+        <p:cTn id="1" dur="indefinite" restart="never" nodeType="tmRoot"/>
+      </p:par>
+    </p:tnLst>
+  </p:timing>
+</p:sld>
+</file>
+
+<file path=ppt/slides/slide12.xml><?xml version="1.0" encoding="utf-8"?>
+<p:sld xmlns:a="http://schemas.openxmlformats.org/drawingml/2006/main" xmlns:r="http://schemas.openxmlformats.org/officeDocument/2006/relationships" xmlns:p="http://schemas.openxmlformats.org/presentationml/2006/main">
+  <p:cSld>
+    <p:spTree>
+      <p:nvGrpSpPr>
+        <p:cNvPr id="1" name=""/>
+        <p:cNvGrpSpPr/>
+        <p:nvPr/>
+      </p:nvGrpSpPr>
+      <p:grpSpPr>
+        <a:xfrm>
+          <a:off x="0" y="0"/>
+          <a:ext cx="0" cy="0"/>
+          <a:chOff x="0" y="0"/>
+          <a:chExt cx="0" cy="0"/>
+        </a:xfrm>
+      </p:grpSpPr>
+      <p:sp>
+        <p:nvSpPr>
+          <p:cNvPr id="2" name="Title 1"/>
+          <p:cNvSpPr>
+            <a:spLocks noGrp="1"/>
+          </p:cNvSpPr>
+          <p:nvPr>
+            <p:ph type="title"/>
+          </p:nvPr>
+        </p:nvSpPr>
+        <p:spPr/>
+        <p:txBody>
           <a:bodyPr>
             <a:normAutofit fontScale="90000"/>
           </a:bodyPr>
@@ -4413,15 +4562,7 @@
             </a:pPr>
             <a:r>
               <a:rPr lang="en-US" dirty="0"/>
-              <a:t>Check </a:t>
-            </a:r>
-            <a:r>
-              <a:rPr lang="en-US" dirty="0"/>
-              <a:t>ControlPanel</a:t>
-            </a:r>
-            <a:r>
-              <a:rPr lang="en-US" dirty="0"/>
-              <a:t> and OpenCV-2.3.1 projects -</a:t>
+              <a:t>Check ControlPanel and OpenCV-2.3.1 projects -</a:t>
             </a:r>
             <a:r>
               <a:rPr lang="en-US" dirty="0" smtClean="0"/>
@@ -4453,15 +4594,7 @@
             </a:pPr>
             <a:r>
               <a:rPr lang="en-US" dirty="0"/>
-              <a:t>Right Click in </a:t>
-            </a:r>
-            <a:r>
-              <a:rPr lang="en-US" dirty="0"/>
-              <a:t>ControlPanel</a:t>
-            </a:r>
-            <a:r>
-              <a:rPr lang="en-US" dirty="0"/>
-              <a:t> project - Run as </a:t>
+              <a:t>Right Click in ControlPanel project - Run as </a:t>
             </a:r>
             <a:r>
               <a:rPr lang="en-US" dirty="0" smtClean="0"/>
@@ -4527,7 +4660,7 @@
 </p:sld>
 </file>
 
-<file path=ppt/slides/slide11.xml><?xml version="1.0" encoding="utf-8"?>
+<file path=ppt/slides/slide13.xml><?xml version="1.0" encoding="utf-8"?>
 <p:sld xmlns:a="http://schemas.openxmlformats.org/drawingml/2006/main" xmlns:r="http://schemas.openxmlformats.org/officeDocument/2006/relationships" xmlns:p="http://schemas.openxmlformats.org/presentationml/2006/main">
   <p:cSld>
     <p:spTree>
@@ -4751,10 +4884,10 @@
           <a:lstStyle/>
           <a:p>
             <a:r>
-              <a:rPr lang="es-ES" dirty="0" err="1" smtClean="0"/>
-              <a:t>Introduction</a:t>
-            </a:r>
-            <a:endParaRPr lang="es-ES" dirty="0"/>
+              <a:rPr lang="en-US" dirty="0" smtClean="0"/>
+              <a:t>Index</a:t>
+            </a:r>
+            <a:endParaRPr lang="en-US" dirty="0"/>
           </a:p>
         </p:txBody>
       </p:sp>
@@ -4773,6 +4906,248 @@
           <a:bodyPr/>
           <a:lstStyle/>
           <a:p>
+            <a:r>
+              <a:rPr lang="en-US" dirty="0" smtClean="0"/>
+              <a:t>Introduction</a:t>
+            </a:r>
+          </a:p>
+          <a:p>
+            <a:r>
+              <a:rPr lang="en-US" dirty="0" smtClean="0"/>
+              <a:t>Architecture</a:t>
+            </a:r>
+          </a:p>
+          <a:p>
+            <a:pPr lvl="1"/>
+            <a:r>
+              <a:rPr lang="en-US" dirty="0"/>
+              <a:t>Emoticon </a:t>
+            </a:r>
+            <a:r>
+              <a:rPr lang="en-US" dirty="0" smtClean="0"/>
+              <a:t>Selection</a:t>
+            </a:r>
+          </a:p>
+          <a:p>
+            <a:pPr lvl="1"/>
+            <a:r>
+              <a:rPr lang="en-US" dirty="0" smtClean="0"/>
+              <a:t>Algorithmic</a:t>
+            </a:r>
+          </a:p>
+          <a:p>
+            <a:pPr lvl="1"/>
+            <a:r>
+              <a:rPr lang="en-US" dirty="0"/>
+              <a:t>Image </a:t>
+            </a:r>
+            <a:r>
+              <a:rPr lang="en-US" dirty="0" smtClean="0"/>
+              <a:t>Manager</a:t>
+            </a:r>
+          </a:p>
+          <a:p>
+            <a:r>
+              <a:rPr lang="en-US" dirty="0" smtClean="0"/>
+              <a:t>Project Improvements</a:t>
+            </a:r>
+          </a:p>
+          <a:p>
+            <a:r>
+              <a:rPr lang="en-US" dirty="0"/>
+              <a:t>Steps for deploying the </a:t>
+            </a:r>
+            <a:r>
+              <a:rPr lang="en-US" dirty="0" smtClean="0"/>
+              <a:t>application</a:t>
+            </a:r>
+          </a:p>
+          <a:p>
+            <a:r>
+              <a:rPr lang="en-US" dirty="0"/>
+              <a:t>Steps for using the application</a:t>
+            </a:r>
+            <a:endParaRPr lang="es-ES" dirty="0"/>
+          </a:p>
+        </p:txBody>
+      </p:sp>
+    </p:spTree>
+    <p:extLst>
+      <p:ext uri="{BB962C8B-B14F-4D97-AF65-F5344CB8AC3E}">
+        <p14:creationId xmlns:p14="http://schemas.microsoft.com/office/powerpoint/2010/main" val="3088948336"/>
+      </p:ext>
+    </p:extLst>
+  </p:cSld>
+  <p:clrMapOvr>
+    <a:masterClrMapping/>
+  </p:clrMapOvr>
+</p:sld>
+</file>
+
+<file path=ppt/slides/slide3.xml><?xml version="1.0" encoding="utf-8"?>
+<p:sld xmlns:a="http://schemas.openxmlformats.org/drawingml/2006/main" xmlns:r="http://schemas.openxmlformats.org/officeDocument/2006/relationships" xmlns:p="http://schemas.openxmlformats.org/presentationml/2006/main">
+  <p:cSld>
+    <p:spTree>
+      <p:nvGrpSpPr>
+        <p:cNvPr id="1" name=""/>
+        <p:cNvGrpSpPr/>
+        <p:nvPr/>
+      </p:nvGrpSpPr>
+      <p:grpSpPr>
+        <a:xfrm>
+          <a:off x="0" y="0"/>
+          <a:ext cx="0" cy="0"/>
+          <a:chOff x="0" y="0"/>
+          <a:chExt cx="0" cy="0"/>
+        </a:xfrm>
+      </p:grpSpPr>
+      <p:sp>
+        <p:nvSpPr>
+          <p:cNvPr id="2" name="Title 1"/>
+          <p:cNvSpPr>
+            <a:spLocks noGrp="1"/>
+          </p:cNvSpPr>
+          <p:nvPr>
+            <p:ph type="title"/>
+          </p:nvPr>
+        </p:nvSpPr>
+        <p:spPr/>
+        <p:txBody>
+          <a:bodyPr/>
+          <a:lstStyle/>
+          <a:p>
+            <a:r>
+              <a:rPr lang="en-US" dirty="0" smtClean="0"/>
+              <a:t>Introduction</a:t>
+            </a:r>
+            <a:endParaRPr lang="en-US" dirty="0"/>
+          </a:p>
+        </p:txBody>
+      </p:sp>
+      <p:sp>
+        <p:nvSpPr>
+          <p:cNvPr id="3" name="Content Placeholder 2"/>
+          <p:cNvSpPr>
+            <a:spLocks noGrp="1"/>
+          </p:cNvSpPr>
+          <p:nvPr>
+            <p:ph idx="1"/>
+          </p:nvPr>
+        </p:nvSpPr>
+        <p:spPr/>
+        <p:txBody>
+          <a:bodyPr>
+            <a:normAutofit fontScale="92500" lnSpcReduction="10000"/>
+          </a:bodyPr>
+          <a:lstStyle/>
+          <a:p>
+            <a:r>
+              <a:rPr lang="en-US" b="1" dirty="0" smtClean="0"/>
+              <a:t>Face </a:t>
+            </a:r>
+            <a:r>
+              <a:rPr lang="en-US" b="1" dirty="0" err="1"/>
+              <a:t>Emoticonizer</a:t>
+            </a:r>
+            <a:r>
+              <a:rPr lang="en-US" b="1" dirty="0"/>
+              <a:t>: Facial Feature </a:t>
+            </a:r>
+            <a:r>
+              <a:rPr lang="en-US" b="1" dirty="0" smtClean="0"/>
+              <a:t>Detection and </a:t>
+            </a:r>
+            <a:r>
+              <a:rPr lang="en-US" b="1" dirty="0"/>
+              <a:t>Changing on </a:t>
+            </a:r>
+            <a:r>
+              <a:rPr lang="en-US" b="1" dirty="0" smtClean="0"/>
+              <a:t>Android </a:t>
+            </a:r>
+          </a:p>
+          <a:p>
+            <a:r>
+              <a:rPr lang="en-US" dirty="0" smtClean="0"/>
+              <a:t>Author: Kun Yi</a:t>
+            </a:r>
+          </a:p>
+          <a:p>
+            <a:r>
+              <a:rPr lang="en-US" dirty="0" smtClean="0"/>
+              <a:t>Department </a:t>
+            </a:r>
+            <a:r>
+              <a:rPr lang="en-US" dirty="0"/>
+              <a:t>of Electrical </a:t>
+            </a:r>
+            <a:r>
+              <a:rPr lang="en-US" dirty="0" smtClean="0"/>
+              <a:t>Engineering, Stanford University</a:t>
+            </a:r>
+          </a:p>
+          <a:p>
+            <a:r>
+              <a:rPr lang="es-ES" dirty="0"/>
+              <a:t>Project </a:t>
+            </a:r>
+            <a:r>
+              <a:rPr lang="es-ES" dirty="0" err="1"/>
+              <a:t>for</a:t>
+            </a:r>
+            <a:r>
+              <a:rPr lang="es-ES" dirty="0"/>
+              <a:t> Spring </a:t>
+            </a:r>
+            <a:r>
+              <a:rPr lang="es-ES" dirty="0" smtClean="0"/>
+              <a:t>2012</a:t>
+            </a:r>
+          </a:p>
+          <a:p>
+            <a:r>
+              <a:rPr lang="es-ES" dirty="0" err="1"/>
+              <a:t>Goal</a:t>
+            </a:r>
+            <a:r>
+              <a:rPr lang="es-ES" dirty="0" smtClean="0"/>
+              <a:t>: </a:t>
+            </a:r>
+            <a:r>
+              <a:rPr lang="en-US" dirty="0" smtClean="0"/>
+              <a:t>Fast </a:t>
+            </a:r>
+            <a:r>
+              <a:rPr lang="en-US" dirty="0"/>
+              <a:t>and robust facial feature changing to visualize </a:t>
+            </a:r>
+            <a:r>
+              <a:rPr lang="en-US" dirty="0" smtClean="0"/>
+              <a:t>emoticon</a:t>
+            </a:r>
+            <a:endParaRPr lang="en-US" dirty="0"/>
+          </a:p>
+          <a:p>
+            <a:r>
+              <a:rPr lang="es-ES" dirty="0" err="1"/>
+              <a:t>Challenge</a:t>
+            </a:r>
+            <a:r>
+              <a:rPr lang="es-ES" dirty="0" smtClean="0"/>
+              <a:t>: </a:t>
+            </a:r>
+            <a:r>
+              <a:rPr lang="en-US" dirty="0" smtClean="0"/>
+              <a:t>Face </a:t>
+            </a:r>
+            <a:r>
+              <a:rPr lang="en-US" dirty="0"/>
+              <a:t>feature replacement, stable tracking and </a:t>
+            </a:r>
+            <a:r>
+              <a:rPr lang="en-US" dirty="0" smtClean="0"/>
+              <a:t>performance</a:t>
+            </a:r>
             <a:endParaRPr lang="es-ES" dirty="0"/>
           </a:p>
         </p:txBody>
@@ -4797,7 +5172,7 @@
 </p:sld>
 </file>
 
-<file path=ppt/slides/slide3.xml><?xml version="1.0" encoding="utf-8"?>
+<file path=ppt/slides/slide4.xml><?xml version="1.0" encoding="utf-8"?>
 <p:sld xmlns:a="http://schemas.openxmlformats.org/drawingml/2006/main" xmlns:r="http://schemas.openxmlformats.org/officeDocument/2006/relationships" xmlns:p="http://schemas.openxmlformats.org/presentationml/2006/main">
   <p:cSld>
     <p:spTree>
@@ -4830,13 +5205,10 @@
           <a:lstStyle/>
           <a:p>
             <a:r>
-              <a:rPr lang="es-ES" dirty="0" smtClean="0"/>
-              <a:t>Project </a:t>
-            </a:r>
-            <a:r>
-              <a:rPr lang="en-US" dirty="0"/>
+              <a:rPr lang="en-US" dirty="0" smtClean="0"/>
               <a:t>Architecture</a:t>
             </a:r>
+            <a:endParaRPr lang="en-US" dirty="0"/>
           </a:p>
         </p:txBody>
       </p:sp>
@@ -4934,7 +5306,7 @@
         </p:blipFill>
         <p:spPr bwMode="auto">
           <a:xfrm>
-            <a:off x="1619672" y="4005064"/>
+            <a:off x="1619672" y="4147145"/>
             <a:ext cx="7191375" cy="2162175"/>
           </a:xfrm>
           <a:prstGeom prst="rect">
@@ -4995,146 +5367,6 @@
 </p:sld>
 </file>
 
-<file path=ppt/slides/slide4.xml><?xml version="1.0" encoding="utf-8"?>
-<p:sld xmlns:a="http://schemas.openxmlformats.org/drawingml/2006/main" xmlns:r="http://schemas.openxmlformats.org/officeDocument/2006/relationships" xmlns:p="http://schemas.openxmlformats.org/presentationml/2006/main">
-  <p:cSld>
-    <p:spTree>
-      <p:nvGrpSpPr>
-        <p:cNvPr id="1" name=""/>
-        <p:cNvGrpSpPr/>
-        <p:nvPr/>
-      </p:nvGrpSpPr>
-      <p:grpSpPr>
-        <a:xfrm>
-          <a:off x="0" y="0"/>
-          <a:ext cx="0" cy="0"/>
-          <a:chOff x="0" y="0"/>
-          <a:chExt cx="0" cy="0"/>
-        </a:xfrm>
-      </p:grpSpPr>
-      <p:sp>
-        <p:nvSpPr>
-          <p:cNvPr id="2" name="Title 1"/>
-          <p:cNvSpPr>
-            <a:spLocks noGrp="1"/>
-          </p:cNvSpPr>
-          <p:nvPr>
-            <p:ph type="title"/>
-          </p:nvPr>
-        </p:nvSpPr>
-        <p:spPr/>
-        <p:txBody>
-          <a:bodyPr/>
-          <a:lstStyle/>
-          <a:p>
-            <a:r>
-              <a:rPr lang="en-US" smtClean="0"/>
-              <a:t>Emoticon Selection</a:t>
-            </a:r>
-            <a:endParaRPr lang="en-US"/>
-          </a:p>
-        </p:txBody>
-      </p:sp>
-      <p:sp>
-        <p:nvSpPr>
-          <p:cNvPr id="3" name="Content Placeholder 2"/>
-          <p:cNvSpPr>
-            <a:spLocks noGrp="1"/>
-          </p:cNvSpPr>
-          <p:nvPr>
-            <p:ph idx="1"/>
-          </p:nvPr>
-        </p:nvSpPr>
-        <p:spPr/>
-        <p:txBody>
-          <a:bodyPr>
-            <a:normAutofit fontScale="85000" lnSpcReduction="10000"/>
-          </a:bodyPr>
-          <a:lstStyle/>
-          <a:p>
-            <a:r>
-              <a:rPr lang="en-US" dirty="0" smtClean="0"/>
-              <a:t>Selection between predefined emoticons</a:t>
-            </a:r>
-          </a:p>
-          <a:p>
-            <a:r>
-              <a:rPr lang="en-US" dirty="0" smtClean="0"/>
-              <a:t>Emoticon images will be placed in the ‘raw’ folder</a:t>
-            </a:r>
-          </a:p>
-          <a:p>
-            <a:r>
-              <a:rPr lang="en-US" dirty="0" smtClean="0"/>
-              <a:t>Emoticons will have 2 images inside for: left eye, mouth and right eye.</a:t>
-            </a:r>
-          </a:p>
-          <a:p>
-            <a:r>
-              <a:rPr lang="en-US" dirty="0" smtClean="0"/>
-              <a:t>A list with </a:t>
-            </a:r>
-            <a:r>
-              <a:rPr lang="en-US" dirty="0"/>
-              <a:t>shown </a:t>
-            </a:r>
-            <a:r>
-              <a:rPr lang="en-US" dirty="0" smtClean="0"/>
-              <a:t>names (escaped with /) and the paths of the emoticons will be initialize at the beginning</a:t>
-            </a:r>
-          </a:p>
-          <a:p>
-            <a:r>
-              <a:rPr lang="en-US" dirty="0" smtClean="0"/>
-              <a:t>A </a:t>
-            </a:r>
-            <a:r>
-              <a:rPr lang="en-US" dirty="0" err="1" smtClean="0"/>
-              <a:t>MenuItem</a:t>
-            </a:r>
-            <a:r>
-              <a:rPr lang="en-US" dirty="0" smtClean="0"/>
-              <a:t> List is initialized with the former list</a:t>
-            </a:r>
-          </a:p>
-          <a:p>
-            <a:r>
-              <a:rPr lang="en-US" dirty="0" err="1" smtClean="0"/>
-              <a:t>Emtocions</a:t>
-            </a:r>
-            <a:r>
-              <a:rPr lang="en-US" dirty="0" smtClean="0"/>
-              <a:t> can be added including and image in ‘raw’ folder and including the name, that will be shown, in the first list </a:t>
-            </a:r>
-          </a:p>
-          <a:p>
-            <a:endParaRPr lang="en-US" dirty="0" smtClean="0"/>
-          </a:p>
-          <a:p>
-            <a:endParaRPr lang="en-US" dirty="0"/>
-          </a:p>
-        </p:txBody>
-      </p:sp>
-    </p:spTree>
-    <p:extLst>
-      <p:ext uri="{BB962C8B-B14F-4D97-AF65-F5344CB8AC3E}">
-        <p14:creationId xmlns:p14="http://schemas.microsoft.com/office/powerpoint/2010/main" val="4181063387"/>
-      </p:ext>
-    </p:extLst>
-  </p:cSld>
-  <p:clrMapOvr>
-    <a:masterClrMapping/>
-  </p:clrMapOvr>
-  <p:timing>
-    <p:tnLst>
-      <p:par>
-        <p:cTn id="1" dur="indefinite" restart="never" nodeType="tmRoot"/>
-      </p:par>
-    </p:tnLst>
-  </p:timing>
-</p:sld>
-</file>
-
 <file path=ppt/slides/slide5.xml><?xml version="1.0" encoding="utf-8"?>
 <p:sld xmlns:a="http://schemas.openxmlformats.org/drawingml/2006/main" xmlns:r="http://schemas.openxmlformats.org/officeDocument/2006/relationships" xmlns:p="http://schemas.openxmlformats.org/presentationml/2006/main">
   <p:cSld>
@@ -5169,7 +5401,7 @@
           <a:p>
             <a:r>
               <a:rPr lang="en-US" dirty="0" smtClean="0"/>
-              <a:t>Algorithms</a:t>
+              <a:t>Emoticon Selection</a:t>
             </a:r>
             <a:endParaRPr lang="en-US" dirty="0"/>
           </a:p>
@@ -5188,61 +5420,265 @@
         <p:spPr/>
         <p:txBody>
           <a:bodyPr>
-            <a:normAutofit/>
+            <a:normAutofit fontScale="85000" lnSpcReduction="20000"/>
           </a:bodyPr>
           <a:lstStyle/>
           <a:p>
             <a:r>
+              <a:rPr lang="en-US" dirty="0" smtClean="0"/>
+              <a:t>Selection between predefined emoticons</a:t>
+            </a:r>
+          </a:p>
+          <a:p>
+            <a:r>
+              <a:rPr lang="en-US" dirty="0" smtClean="0"/>
+              <a:t>Emoticon images will be placed in the ‘raw’ folder</a:t>
+            </a:r>
+          </a:p>
+          <a:p>
+            <a:r>
+              <a:rPr lang="en-US" dirty="0" smtClean="0"/>
+              <a:t>Emoticons will have 2 images inside for: left eye, mouth and right eye.</a:t>
+            </a:r>
+          </a:p>
+          <a:p>
+            <a:r>
+              <a:rPr lang="en-US" dirty="0" smtClean="0"/>
+              <a:t>A list with </a:t>
+            </a:r>
+            <a:r>
+              <a:rPr lang="en-US" dirty="0"/>
+              <a:t>shown </a:t>
+            </a:r>
+            <a:r>
+              <a:rPr lang="en-US" dirty="0" smtClean="0"/>
+              <a:t>names (escaped with /) and the paths of the emoticons will be initialize at the </a:t>
+            </a:r>
+            <a:r>
+              <a:rPr lang="en-US" dirty="0" smtClean="0"/>
+              <a:t>beginning</a:t>
+            </a:r>
+          </a:p>
+          <a:p>
+            <a:pPr marL="82296" indent="0">
+              <a:buNone/>
+            </a:pPr>
+            <a:endParaRPr lang="en-US" dirty="0" smtClean="0"/>
+          </a:p>
+          <a:p>
+            <a:pPr marL="82296" indent="0">
+              <a:buNone/>
+            </a:pPr>
+            <a:r>
+              <a:rPr lang="es-ES" sz="1300" i="1" dirty="0" smtClean="0"/>
+              <a:t>	</a:t>
+            </a:r>
+            <a:r>
+              <a:rPr lang="es-ES" sz="1300" i="1" dirty="0" err="1" smtClean="0"/>
+              <a:t>kaomojiList.add</a:t>
+            </a:r>
+            <a:r>
+              <a:rPr lang="es-ES" sz="1300" i="1" dirty="0" smtClean="0"/>
+              <a:t>(</a:t>
+            </a:r>
+            <a:r>
+              <a:rPr lang="es-ES" sz="1300" b="1" i="1" dirty="0" smtClean="0"/>
+              <a:t>new </a:t>
+            </a:r>
+            <a:r>
+              <a:rPr lang="es-ES" sz="1300" b="1" i="1" dirty="0" err="1"/>
+              <a:t>Kaomoji</a:t>
+            </a:r>
+            <a:r>
+              <a:rPr lang="es-ES" sz="1300" b="1" i="1" dirty="0"/>
+              <a:t>("\u2267\u25BD\u2266", </a:t>
+            </a:r>
+            <a:r>
+              <a:rPr lang="es-ES" sz="1300" b="1" i="1" dirty="0" err="1" smtClean="0"/>
+              <a:t>Utils.exportResource</a:t>
+            </a:r>
+            <a:r>
+              <a:rPr lang="es-ES" sz="1300" b="1" i="1" dirty="0" smtClean="0"/>
+              <a:t>(</a:t>
+            </a:r>
+            <a:r>
+              <a:rPr lang="es-ES" sz="1300" dirty="0" err="1" smtClean="0"/>
+              <a:t>context</a:t>
+            </a:r>
+            <a:r>
+              <a:rPr lang="es-ES" sz="1300" dirty="0"/>
+              <a:t>, R.raw.</a:t>
+            </a:r>
+            <a:r>
+              <a:rPr lang="es-ES" sz="1300" i="1" dirty="0"/>
+              <a:t>kaomoji1)))</a:t>
+            </a:r>
+            <a:endParaRPr lang="en-US" sz="1300" dirty="0" smtClean="0"/>
+          </a:p>
+          <a:p>
+            <a:r>
+              <a:rPr lang="en-US" dirty="0" smtClean="0"/>
+              <a:t>A </a:t>
+            </a:r>
+            <a:r>
               <a:rPr lang="en-US" dirty="0" err="1" smtClean="0"/>
-              <a:t>Haar</a:t>
-            </a:r>
-            <a:r>
-              <a:rPr lang="en-US" dirty="0" smtClean="0"/>
-              <a:t> Detection:</a:t>
-            </a:r>
+              <a:t>MenuItem</a:t>
+            </a:r>
+            <a:r>
+              <a:rPr lang="en-US" dirty="0" smtClean="0"/>
+              <a:t> List is initialized with the former list</a:t>
+            </a:r>
+          </a:p>
+          <a:p>
+            <a:r>
+              <a:rPr lang="en-US" dirty="0" err="1" smtClean="0"/>
+              <a:t>Emtocions</a:t>
+            </a:r>
+            <a:r>
+              <a:rPr lang="en-US" dirty="0" smtClean="0"/>
+              <a:t> can be added including and image in ‘raw’ folder and including the name, that will be shown, in the first list </a:t>
+            </a:r>
+          </a:p>
+          <a:p>
+            <a:endParaRPr lang="en-US" dirty="0" smtClean="0"/>
+          </a:p>
+          <a:p>
             <a:endParaRPr lang="en-US" dirty="0"/>
           </a:p>
-          <a:p>
-            <a:pPr lvl="1"/>
-            <a:r>
-              <a:rPr lang="en-US" dirty="0"/>
-              <a:t>Face</a:t>
-            </a:r>
-          </a:p>
-          <a:p>
-            <a:pPr lvl="1"/>
-            <a:r>
-              <a:rPr lang="en-US" dirty="0"/>
-              <a:t>Eyes</a:t>
-            </a:r>
-          </a:p>
-          <a:p>
-            <a:pPr lvl="1"/>
-            <a:r>
-              <a:rPr lang="en-US" dirty="0"/>
-              <a:t>Mouth</a:t>
-            </a:r>
-          </a:p>
-          <a:p>
-            <a:r>
-              <a:rPr lang="en-US" dirty="0" smtClean="0"/>
-              <a:t>Xml for </a:t>
-            </a:r>
-            <a:r>
-              <a:rPr lang="en-US" dirty="0" err="1" smtClean="0"/>
-              <a:t>haar</a:t>
-            </a:r>
-            <a:r>
-              <a:rPr lang="en-US" dirty="0" smtClean="0"/>
-              <a:t> detection placed in ‘raw’ folder</a:t>
-            </a:r>
-          </a:p>
-        </p:txBody>
-      </p:sp>
+        </p:txBody>
+      </p:sp>
+      <p:pic>
+        <p:nvPicPr>
+          <p:cNvPr id="4" name="Picture 3"/>
+          <p:cNvPicPr>
+            <a:picLocks noChangeAspect="1" noChangeArrowheads="1"/>
+          </p:cNvPicPr>
+          <p:nvPr/>
+        </p:nvPicPr>
+        <p:blipFill>
+          <a:blip r:embed="rId2">
+            <a:extLst>
+              <a:ext uri="{28A0092B-C50C-407E-A947-70E740481C1C}">
+                <a14:useLocalDpi xmlns:a14="http://schemas.microsoft.com/office/drawing/2010/main" val="0"/>
+              </a:ext>
+            </a:extLst>
+          </a:blip>
+          <a:srcRect/>
+          <a:stretch>
+            <a:fillRect/>
+          </a:stretch>
+        </p:blipFill>
+        <p:spPr bwMode="auto">
+          <a:xfrm>
+            <a:off x="3635896" y="3789040"/>
+            <a:ext cx="3048000" cy="495300"/>
+          </a:xfrm>
+          <a:prstGeom prst="rect">
+            <a:avLst/>
+          </a:prstGeom>
+          <a:noFill/>
+          <a:ln>
+            <a:noFill/>
+          </a:ln>
+          <a:effectLst/>
+          <a:extLst>
+            <a:ext uri="{909E8E84-426E-40DD-AFC4-6F175D3DCCD1}">
+              <a14:hiddenFill xmlns:a14="http://schemas.microsoft.com/office/drawing/2010/main">
+                <a:solidFill>
+                  <a:schemeClr val="accent1"/>
+                </a:solidFill>
+              </a14:hiddenFill>
+            </a:ext>
+            <a:ext uri="{91240B29-F687-4F45-9708-019B960494DF}">
+              <a14:hiddenLine xmlns:a14="http://schemas.microsoft.com/office/drawing/2010/main" w="9525">
+                <a:solidFill>
+                  <a:schemeClr val="tx1"/>
+                </a:solidFill>
+                <a:miter lim="800000"/>
+                <a:headEnd/>
+                <a:tailEnd/>
+              </a14:hiddenLine>
+            </a:ext>
+            <a:ext uri="{AF507438-7753-43E0-B8FC-AC1667EBCBE1}">
+              <a14:hiddenEffects xmlns:a14="http://schemas.microsoft.com/office/drawing/2010/main">
+                <a:effectLst>
+                  <a:outerShdw dist="35921" dir="2700000" algn="ctr" rotWithShape="0">
+                    <a:schemeClr val="bg2"/>
+                  </a:outerShdw>
+                </a:effectLst>
+              </a14:hiddenEffects>
+            </a:ext>
+          </a:extLst>
+        </p:spPr>
+      </p:pic>
+      <p:pic>
+        <p:nvPicPr>
+          <p:cNvPr id="1026" name="Picture 2"/>
+          <p:cNvPicPr>
+            <a:picLocks noChangeAspect="1" noChangeArrowheads="1"/>
+          </p:cNvPicPr>
+          <p:nvPr/>
+        </p:nvPicPr>
+        <p:blipFill>
+          <a:blip r:embed="rId3" cstate="print">
+            <a:extLst>
+              <a:ext uri="{28A0092B-C50C-407E-A947-70E740481C1C}">
+                <a14:useLocalDpi xmlns:a14="http://schemas.microsoft.com/office/drawing/2010/main" val="0"/>
+              </a:ext>
+            </a:extLst>
+          </a:blip>
+          <a:srcRect/>
+          <a:stretch>
+            <a:fillRect/>
+          </a:stretch>
+        </p:blipFill>
+        <p:spPr bwMode="auto">
+          <a:xfrm>
+            <a:off x="5060090" y="2708920"/>
+            <a:ext cx="680256" cy="253255"/>
+          </a:xfrm>
+          <a:prstGeom prst="rect">
+            <a:avLst/>
+          </a:prstGeom>
+          <a:noFill/>
+          <a:ln>
+            <a:noFill/>
+          </a:ln>
+          <a:effectLst/>
+          <a:extLst>
+            <a:ext uri="{909E8E84-426E-40DD-AFC4-6F175D3DCCD1}">
+              <a14:hiddenFill xmlns:a14="http://schemas.microsoft.com/office/drawing/2010/main">
+                <a:solidFill>
+                  <a:schemeClr val="accent1"/>
+                </a:solidFill>
+              </a14:hiddenFill>
+            </a:ext>
+            <a:ext uri="{91240B29-F687-4F45-9708-019B960494DF}">
+              <a14:hiddenLine xmlns:a14="http://schemas.microsoft.com/office/drawing/2010/main" w="9525">
+                <a:solidFill>
+                  <a:schemeClr val="tx1"/>
+                </a:solidFill>
+                <a:miter lim="800000"/>
+                <a:headEnd/>
+                <a:tailEnd/>
+              </a14:hiddenLine>
+            </a:ext>
+            <a:ext uri="{AF507438-7753-43E0-B8FC-AC1667EBCBE1}">
+              <a14:hiddenEffects xmlns:a14="http://schemas.microsoft.com/office/drawing/2010/main">
+                <a:effectLst>
+                  <a:outerShdw dist="35921" dir="2700000" algn="ctr" rotWithShape="0">
+                    <a:schemeClr val="bg2"/>
+                  </a:outerShdw>
+                </a:effectLst>
+              </a14:hiddenEffects>
+            </a:ext>
+          </a:extLst>
+        </p:spPr>
+      </p:pic>
     </p:spTree>
     <p:extLst>
       <p:ext uri="{BB962C8B-B14F-4D97-AF65-F5344CB8AC3E}">
-        <p14:creationId xmlns:p14="http://schemas.microsoft.com/office/powerpoint/2010/main" val="3897265337"/>
+        <p14:creationId xmlns:p14="http://schemas.microsoft.com/office/powerpoint/2010/main" val="4181063387"/>
       </p:ext>
     </p:extLst>
   </p:cSld>
@@ -5482,10 +5918,10 @@
           <a:lstStyle/>
           <a:p>
             <a:r>
-              <a:rPr lang="en-US" smtClean="0"/>
-              <a:t>Image Manager</a:t>
-            </a:r>
-            <a:endParaRPr lang="en-US"/>
+              <a:rPr lang="en-US" dirty="0" smtClean="0"/>
+              <a:t>Algorithmic</a:t>
+            </a:r>
+            <a:endParaRPr lang="en-US" dirty="0"/>
           </a:p>
         </p:txBody>
       </p:sp>
@@ -5502,280 +5938,61 @@
         <p:spPr/>
         <p:txBody>
           <a:bodyPr>
-            <a:normAutofit fontScale="70000" lnSpcReduction="20000"/>
+            <a:normAutofit/>
           </a:bodyPr>
           <a:lstStyle/>
           <a:p>
             <a:r>
-              <a:rPr lang="en-US" dirty="0" smtClean="0"/>
-              <a:t>Capture</a:t>
-            </a:r>
+              <a:rPr lang="en-US" dirty="0" err="1" smtClean="0"/>
+              <a:t>Haar</a:t>
+            </a:r>
+            <a:r>
+              <a:rPr lang="en-US" dirty="0" smtClean="0"/>
+              <a:t> Detection:</a:t>
+            </a:r>
+            <a:endParaRPr lang="en-US" dirty="0"/>
           </a:p>
           <a:p>
             <a:pPr lvl="1"/>
             <a:r>
+              <a:rPr lang="en-US" dirty="0"/>
+              <a:t>Face</a:t>
+            </a:r>
+          </a:p>
+          <a:p>
+            <a:pPr lvl="1"/>
+            <a:r>
+              <a:rPr lang="en-US" dirty="0"/>
+              <a:t>Eyes</a:t>
+            </a:r>
+          </a:p>
+          <a:p>
+            <a:pPr lvl="1"/>
+            <a:r>
+              <a:rPr lang="en-US" dirty="0"/>
+              <a:t>Mouth</a:t>
+            </a:r>
+          </a:p>
+          <a:p>
+            <a:r>
+              <a:rPr lang="en-US" dirty="0" smtClean="0"/>
+              <a:t>Xml for </a:t>
+            </a:r>
+            <a:r>
               <a:rPr lang="en-US" dirty="0" err="1" smtClean="0"/>
-              <a:t>AmdroidManifest</a:t>
-            </a:r>
-            <a:r>
-              <a:rPr lang="en-US" dirty="0" smtClean="0"/>
-              <a:t> .xml camera </a:t>
-            </a:r>
-            <a:r>
-              <a:rPr lang="en-US" dirty="0" err="1" smtClean="0"/>
-              <a:t>permisions</a:t>
-            </a:r>
-            <a:r>
-              <a:rPr lang="en-US" dirty="0" smtClean="0"/>
-              <a:t>:</a:t>
-            </a:r>
-            <a:endParaRPr lang="en-US" dirty="0"/>
-          </a:p>
-          <a:p>
-            <a:pPr marL="82296" indent="0">
-              <a:buNone/>
-            </a:pPr>
-            <a:r>
-              <a:rPr lang="es-ES" sz="1100" dirty="0"/>
-              <a:t>	&lt;uses-</a:t>
-            </a:r>
-            <a:r>
-              <a:rPr lang="es-ES" sz="1100" dirty="0" err="1"/>
-              <a:t>permission</a:t>
-            </a:r>
-            <a:r>
-              <a:rPr lang="es-ES" sz="1100" dirty="0"/>
-              <a:t> </a:t>
-            </a:r>
-            <a:r>
-              <a:rPr lang="es-ES" sz="1100" dirty="0" err="1"/>
-              <a:t>android:name</a:t>
-            </a:r>
-            <a:r>
-              <a:rPr lang="es-ES" sz="1100" dirty="0"/>
-              <a:t>=</a:t>
-            </a:r>
-            <a:r>
-              <a:rPr lang="es-ES" sz="1100" i="1" dirty="0"/>
-              <a:t>"</a:t>
-            </a:r>
-            <a:r>
-              <a:rPr lang="es-ES" sz="1100" i="1" dirty="0" err="1"/>
-              <a:t>android.permission.CAMERA</a:t>
-            </a:r>
-            <a:r>
-              <a:rPr lang="es-ES" sz="1100" i="1" dirty="0"/>
-              <a:t>"/&gt;</a:t>
-            </a:r>
-          </a:p>
-          <a:p>
-            <a:pPr marL="82296" indent="0">
-              <a:buNone/>
-            </a:pPr>
-            <a:r>
-              <a:rPr lang="es-ES" sz="1100" dirty="0"/>
-              <a:t>	&lt;uses-</a:t>
-            </a:r>
-            <a:r>
-              <a:rPr lang="es-ES" sz="1100" dirty="0" err="1"/>
-              <a:t>feature</a:t>
-            </a:r>
-            <a:r>
-              <a:rPr lang="es-ES" sz="1100" dirty="0"/>
-              <a:t> </a:t>
-            </a:r>
-            <a:r>
-              <a:rPr lang="es-ES" sz="1100" dirty="0" err="1"/>
-              <a:t>android:name</a:t>
-            </a:r>
-            <a:r>
-              <a:rPr lang="es-ES" sz="1100" dirty="0"/>
-              <a:t>=</a:t>
-            </a:r>
-            <a:r>
-              <a:rPr lang="es-ES" sz="1100" i="1" dirty="0"/>
-              <a:t>"</a:t>
-            </a:r>
-            <a:r>
-              <a:rPr lang="es-ES" sz="1100" i="1" dirty="0" err="1"/>
-              <a:t>android.hardware.camera</a:t>
-            </a:r>
-            <a:r>
-              <a:rPr lang="es-ES" sz="1100" i="1" dirty="0"/>
-              <a:t>" /&gt;</a:t>
-            </a:r>
-          </a:p>
-          <a:p>
-            <a:pPr marL="82296" indent="0">
-              <a:buNone/>
-            </a:pPr>
-            <a:r>
-              <a:rPr lang="es-ES" sz="1100" dirty="0"/>
-              <a:t>	&lt;uses-</a:t>
-            </a:r>
-            <a:r>
-              <a:rPr lang="es-ES" sz="1100" dirty="0" err="1"/>
-              <a:t>feature</a:t>
-            </a:r>
-            <a:r>
-              <a:rPr lang="es-ES" sz="1100" dirty="0"/>
-              <a:t> </a:t>
-            </a:r>
-            <a:r>
-              <a:rPr lang="es-ES" sz="1100" dirty="0" err="1"/>
-              <a:t>android:name</a:t>
-            </a:r>
-            <a:r>
-              <a:rPr lang="es-ES" sz="1100" dirty="0"/>
-              <a:t>=</a:t>
-            </a:r>
-            <a:r>
-              <a:rPr lang="es-ES" sz="1100" i="1" dirty="0"/>
-              <a:t>"</a:t>
-            </a:r>
-            <a:r>
-              <a:rPr lang="es-ES" sz="1100" i="1" dirty="0" err="1"/>
-              <a:t>android.hardware.camera.autofocus</a:t>
-            </a:r>
-            <a:r>
-              <a:rPr lang="es-ES" sz="1100" i="1" dirty="0"/>
-              <a:t>" /&gt;</a:t>
-            </a:r>
-            <a:endParaRPr lang="en-US" sz="1100" dirty="0"/>
-          </a:p>
-          <a:p>
-            <a:pPr lvl="1"/>
-            <a:r>
-              <a:rPr lang="en-US" dirty="0" smtClean="0"/>
-              <a:t>View: Class extended of  ‘</a:t>
-            </a:r>
-            <a:r>
-              <a:rPr lang="en-US" dirty="0" err="1" smtClean="0"/>
-              <a:t>SurfaceView</a:t>
-            </a:r>
-            <a:r>
-              <a:rPr lang="en-US" dirty="0" smtClean="0"/>
-              <a:t>’</a:t>
-            </a:r>
-          </a:p>
-          <a:p>
-            <a:pPr lvl="1"/>
-            <a:r>
-              <a:rPr lang="en-US" dirty="0" smtClean="0"/>
-              <a:t>Gets the image from ‘</a:t>
-            </a:r>
-            <a:r>
-              <a:rPr lang="es-ES" dirty="0" err="1" smtClean="0"/>
-              <a:t>VideoCapture</a:t>
-            </a:r>
-            <a:r>
-              <a:rPr lang="es-ES" dirty="0" smtClean="0"/>
-              <a:t>’ of </a:t>
-            </a:r>
-            <a:r>
-              <a:rPr lang="es-ES" dirty="0" err="1" smtClean="0"/>
-              <a:t>OpenCV</a:t>
-            </a:r>
-            <a:endParaRPr lang="en-US" dirty="0" smtClean="0"/>
-          </a:p>
-          <a:p>
-            <a:pPr lvl="1"/>
-            <a:r>
-              <a:rPr lang="en-US" dirty="0"/>
-              <a:t>Iterative </a:t>
-            </a:r>
-            <a:r>
-              <a:rPr lang="en-US" dirty="0" smtClean="0"/>
-              <a:t>process in a separate thread (avoiding hang the app)</a:t>
-            </a:r>
-          </a:p>
-          <a:p>
-            <a:r>
-              <a:rPr lang="en-US" dirty="0" smtClean="0"/>
-              <a:t>Drawing</a:t>
-            </a:r>
-          </a:p>
-          <a:p>
-            <a:pPr lvl="1"/>
-            <a:r>
-              <a:rPr lang="en-US" dirty="0" smtClean="0"/>
-              <a:t>Implemented in the ‘View’ class</a:t>
-            </a:r>
-          </a:p>
-          <a:p>
-            <a:pPr lvl="1"/>
-            <a:r>
-              <a:rPr lang="en-US" dirty="0" err="1" smtClean="0"/>
-              <a:t>VideoCapture</a:t>
-            </a:r>
-            <a:r>
-              <a:rPr lang="en-US" dirty="0" smtClean="0"/>
-              <a:t> is duplicated in two copies:</a:t>
-            </a:r>
-          </a:p>
-          <a:p>
-            <a:pPr lvl="2"/>
-            <a:r>
-              <a:rPr lang="en-US" dirty="0" smtClean="0"/>
-              <a:t>Color copy</a:t>
-            </a:r>
-          </a:p>
-          <a:p>
-            <a:pPr lvl="2"/>
-            <a:r>
-              <a:rPr lang="en-US" dirty="0" err="1" smtClean="0"/>
-              <a:t>Grayscale</a:t>
-            </a:r>
-            <a:r>
-              <a:rPr lang="en-US" dirty="0" smtClean="0"/>
-              <a:t> copy</a:t>
-            </a:r>
-          </a:p>
-          <a:p>
-            <a:pPr lvl="1"/>
-            <a:r>
-              <a:rPr lang="en-US" dirty="0" smtClean="0"/>
-              <a:t>Image is processed by the algorithm</a:t>
-            </a:r>
-          </a:p>
-          <a:p>
-            <a:pPr lvl="1"/>
-            <a:r>
-              <a:rPr lang="en-US" dirty="0" smtClean="0"/>
-              <a:t>Result image is copied to ‘Bitmap’ object </a:t>
-            </a:r>
-          </a:p>
-          <a:p>
-            <a:pPr lvl="1"/>
-            <a:r>
-              <a:rPr lang="en-US" dirty="0"/>
-              <a:t>‘Bitmap’ object </a:t>
-            </a:r>
-            <a:r>
-              <a:rPr lang="en-US" dirty="0" smtClean="0"/>
-              <a:t>is drawn with a ‘Canvas’ object</a:t>
-            </a:r>
-          </a:p>
-          <a:p>
-            <a:pPr lvl="1"/>
-            <a:endParaRPr lang="en-US" dirty="0" smtClean="0"/>
-          </a:p>
-          <a:p>
-            <a:pPr marL="658368" lvl="2" indent="0">
-              <a:buNone/>
-            </a:pPr>
-            <a:endParaRPr lang="en-US" dirty="0" smtClean="0"/>
-          </a:p>
-          <a:p>
-            <a:pPr lvl="1"/>
-            <a:endParaRPr lang="en-US" dirty="0"/>
+              <a:t>haar</a:t>
+            </a:r>
+            <a:r>
+              <a:rPr lang="en-US" dirty="0" smtClean="0"/>
+              <a:t> detection placed in ‘raw’ folder</a:t>
+            </a:r>
           </a:p>
         </p:txBody>
       </p:sp>
     </p:spTree>
     <p:extLst>
       <p:ext uri="{BB962C8B-B14F-4D97-AF65-F5344CB8AC3E}">
-        <p14:creationId xmlns:p14="http://schemas.microsoft.com/office/powerpoint/2010/main" val="832436354"/>
+        <p14:creationId xmlns:p14="http://schemas.microsoft.com/office/powerpoint/2010/main" val="3897265337"/>
       </p:ext>
     </p:extLst>
   </p:cSld>
@@ -5826,7 +6043,354 @@
           <a:p>
             <a:r>
               <a:rPr lang="en-US" dirty="0" smtClean="0"/>
-              <a:t>Project Modifications</a:t>
+              <a:t>Image Manager</a:t>
+            </a:r>
+            <a:endParaRPr lang="en-US" dirty="0"/>
+          </a:p>
+        </p:txBody>
+      </p:sp>
+      <p:sp>
+        <p:nvSpPr>
+          <p:cNvPr id="3" name="Content Placeholder 2"/>
+          <p:cNvSpPr>
+            <a:spLocks noGrp="1"/>
+          </p:cNvSpPr>
+          <p:nvPr>
+            <p:ph idx="1"/>
+          </p:nvPr>
+        </p:nvSpPr>
+        <p:spPr/>
+        <p:txBody>
+          <a:bodyPr>
+            <a:normAutofit fontScale="70000" lnSpcReduction="20000"/>
+          </a:bodyPr>
+          <a:lstStyle/>
+          <a:p>
+            <a:r>
+              <a:rPr lang="en-US" dirty="0" smtClean="0"/>
+              <a:t>Capture</a:t>
+            </a:r>
+          </a:p>
+          <a:p>
+            <a:pPr lvl="1"/>
+            <a:r>
+              <a:rPr lang="en-US" dirty="0" err="1" smtClean="0"/>
+              <a:t>AmdroidManifest</a:t>
+            </a:r>
+            <a:r>
+              <a:rPr lang="en-US" dirty="0" smtClean="0"/>
+              <a:t> .xml camera </a:t>
+            </a:r>
+            <a:r>
+              <a:rPr lang="en-US" dirty="0" err="1" smtClean="0"/>
+              <a:t>permisions</a:t>
+            </a:r>
+            <a:r>
+              <a:rPr lang="en-US" dirty="0" smtClean="0"/>
+              <a:t>:</a:t>
+            </a:r>
+            <a:endParaRPr lang="en-US" dirty="0"/>
+          </a:p>
+          <a:p>
+            <a:pPr marL="82296" indent="0">
+              <a:buNone/>
+            </a:pPr>
+            <a:r>
+              <a:rPr lang="es-ES" sz="1100" dirty="0"/>
+              <a:t>	&lt;uses-</a:t>
+            </a:r>
+            <a:r>
+              <a:rPr lang="es-ES" sz="1100" dirty="0" err="1"/>
+              <a:t>permission</a:t>
+            </a:r>
+            <a:r>
+              <a:rPr lang="es-ES" sz="1100" dirty="0"/>
+              <a:t> </a:t>
+            </a:r>
+            <a:r>
+              <a:rPr lang="es-ES" sz="1100" dirty="0" err="1"/>
+              <a:t>android:name</a:t>
+            </a:r>
+            <a:r>
+              <a:rPr lang="es-ES" sz="1100" dirty="0"/>
+              <a:t>=</a:t>
+            </a:r>
+            <a:r>
+              <a:rPr lang="es-ES" sz="1100" i="1" dirty="0"/>
+              <a:t>"</a:t>
+            </a:r>
+            <a:r>
+              <a:rPr lang="es-ES" sz="1100" i="1" dirty="0" err="1"/>
+              <a:t>android.permission.CAMERA</a:t>
+            </a:r>
+            <a:r>
+              <a:rPr lang="es-ES" sz="1100" i="1" dirty="0"/>
+              <a:t>"/&gt;</a:t>
+            </a:r>
+          </a:p>
+          <a:p>
+            <a:pPr marL="82296" indent="0">
+              <a:buNone/>
+            </a:pPr>
+            <a:r>
+              <a:rPr lang="es-ES" sz="1100" dirty="0"/>
+              <a:t>	&lt;uses-</a:t>
+            </a:r>
+            <a:r>
+              <a:rPr lang="es-ES" sz="1100" dirty="0" err="1"/>
+              <a:t>feature</a:t>
+            </a:r>
+            <a:r>
+              <a:rPr lang="es-ES" sz="1100" dirty="0"/>
+              <a:t> </a:t>
+            </a:r>
+            <a:r>
+              <a:rPr lang="es-ES" sz="1100" dirty="0" err="1"/>
+              <a:t>android:name</a:t>
+            </a:r>
+            <a:r>
+              <a:rPr lang="es-ES" sz="1100" dirty="0"/>
+              <a:t>=</a:t>
+            </a:r>
+            <a:r>
+              <a:rPr lang="es-ES" sz="1100" i="1" dirty="0"/>
+              <a:t>"</a:t>
+            </a:r>
+            <a:r>
+              <a:rPr lang="es-ES" sz="1100" i="1" dirty="0" err="1"/>
+              <a:t>android.hardware.camera</a:t>
+            </a:r>
+            <a:r>
+              <a:rPr lang="es-ES" sz="1100" i="1" dirty="0"/>
+              <a:t>" /&gt;</a:t>
+            </a:r>
+          </a:p>
+          <a:p>
+            <a:pPr marL="82296" indent="0">
+              <a:buNone/>
+            </a:pPr>
+            <a:r>
+              <a:rPr lang="es-ES" sz="1100" dirty="0"/>
+              <a:t>	&lt;uses-</a:t>
+            </a:r>
+            <a:r>
+              <a:rPr lang="es-ES" sz="1100" dirty="0" err="1"/>
+              <a:t>feature</a:t>
+            </a:r>
+            <a:r>
+              <a:rPr lang="es-ES" sz="1100" dirty="0"/>
+              <a:t> </a:t>
+            </a:r>
+            <a:r>
+              <a:rPr lang="es-ES" sz="1100" dirty="0" err="1"/>
+              <a:t>android:name</a:t>
+            </a:r>
+            <a:r>
+              <a:rPr lang="es-ES" sz="1100" dirty="0"/>
+              <a:t>=</a:t>
+            </a:r>
+            <a:r>
+              <a:rPr lang="es-ES" sz="1100" i="1" dirty="0"/>
+              <a:t>"</a:t>
+            </a:r>
+            <a:r>
+              <a:rPr lang="es-ES" sz="1100" i="1" dirty="0" err="1"/>
+              <a:t>android.hardware.camera.autofocus</a:t>
+            </a:r>
+            <a:r>
+              <a:rPr lang="es-ES" sz="1100" i="1" dirty="0"/>
+              <a:t>" /&gt;</a:t>
+            </a:r>
+            <a:endParaRPr lang="en-US" sz="1100" dirty="0"/>
+          </a:p>
+          <a:p>
+            <a:pPr lvl="1"/>
+            <a:r>
+              <a:rPr lang="en-US" dirty="0" smtClean="0"/>
+              <a:t>View: Class extended of  ‘</a:t>
+            </a:r>
+            <a:r>
+              <a:rPr lang="en-US" dirty="0" err="1" smtClean="0"/>
+              <a:t>SurfaceView</a:t>
+            </a:r>
+            <a:r>
+              <a:rPr lang="en-US" dirty="0" smtClean="0"/>
+              <a:t>’</a:t>
+            </a:r>
+          </a:p>
+          <a:p>
+            <a:pPr lvl="1"/>
+            <a:r>
+              <a:rPr lang="en-US" dirty="0" smtClean="0"/>
+              <a:t>Gets the image from ‘</a:t>
+            </a:r>
+            <a:r>
+              <a:rPr lang="es-ES" dirty="0" err="1" smtClean="0"/>
+              <a:t>VideoCapture</a:t>
+            </a:r>
+            <a:r>
+              <a:rPr lang="es-ES" dirty="0" smtClean="0"/>
+              <a:t>’ of </a:t>
+            </a:r>
+            <a:r>
+              <a:rPr lang="es-ES" dirty="0" err="1" smtClean="0"/>
+              <a:t>OpenCV</a:t>
+            </a:r>
+            <a:endParaRPr lang="en-US" dirty="0" smtClean="0"/>
+          </a:p>
+          <a:p>
+            <a:pPr lvl="1"/>
+            <a:r>
+              <a:rPr lang="en-US" dirty="0"/>
+              <a:t>Iterative </a:t>
+            </a:r>
+            <a:r>
+              <a:rPr lang="en-US" dirty="0" smtClean="0"/>
+              <a:t>process in a separate thread (avoiding hang the app)</a:t>
+            </a:r>
+          </a:p>
+          <a:p>
+            <a:r>
+              <a:rPr lang="en-US" dirty="0" smtClean="0"/>
+              <a:t>Drawing</a:t>
+            </a:r>
+          </a:p>
+          <a:p>
+            <a:pPr lvl="1"/>
+            <a:r>
+              <a:rPr lang="en-US" dirty="0" smtClean="0"/>
+              <a:t>Implemented in the ‘View’ class</a:t>
+            </a:r>
+          </a:p>
+          <a:p>
+            <a:pPr lvl="1"/>
+            <a:r>
+              <a:rPr lang="en-US" dirty="0" err="1" smtClean="0"/>
+              <a:t>VideoCapture</a:t>
+            </a:r>
+            <a:r>
+              <a:rPr lang="en-US" dirty="0" smtClean="0"/>
+              <a:t> is duplicated in two copies:</a:t>
+            </a:r>
+          </a:p>
+          <a:p>
+            <a:pPr lvl="2"/>
+            <a:r>
+              <a:rPr lang="en-US" dirty="0" smtClean="0"/>
+              <a:t>Color copy</a:t>
+            </a:r>
+          </a:p>
+          <a:p>
+            <a:pPr lvl="2"/>
+            <a:r>
+              <a:rPr lang="en-US" dirty="0" err="1" smtClean="0"/>
+              <a:t>Grayscale</a:t>
+            </a:r>
+            <a:r>
+              <a:rPr lang="en-US" dirty="0" smtClean="0"/>
+              <a:t> copy</a:t>
+            </a:r>
+          </a:p>
+          <a:p>
+            <a:pPr lvl="1"/>
+            <a:r>
+              <a:rPr lang="en-US" dirty="0" smtClean="0"/>
+              <a:t>Image is processed by the algorithm</a:t>
+            </a:r>
+          </a:p>
+          <a:p>
+            <a:pPr lvl="1"/>
+            <a:r>
+              <a:rPr lang="en-US" dirty="0" smtClean="0"/>
+              <a:t>Result image is copied to ‘Bitmap’ object </a:t>
+            </a:r>
+          </a:p>
+          <a:p>
+            <a:pPr lvl="1"/>
+            <a:r>
+              <a:rPr lang="en-US" dirty="0"/>
+              <a:t>‘Bitmap’ object </a:t>
+            </a:r>
+            <a:r>
+              <a:rPr lang="en-US" dirty="0" smtClean="0"/>
+              <a:t>is drawn with a ‘Canvas’ object</a:t>
+            </a:r>
+          </a:p>
+          <a:p>
+            <a:pPr lvl="1"/>
+            <a:endParaRPr lang="en-US" dirty="0" smtClean="0"/>
+          </a:p>
+          <a:p>
+            <a:pPr marL="658368" lvl="2" indent="0">
+              <a:buNone/>
+            </a:pPr>
+            <a:endParaRPr lang="en-US" dirty="0" smtClean="0"/>
+          </a:p>
+          <a:p>
+            <a:pPr lvl="1"/>
+            <a:endParaRPr lang="en-US" dirty="0"/>
+          </a:p>
+        </p:txBody>
+      </p:sp>
+    </p:spTree>
+    <p:extLst>
+      <p:ext uri="{BB962C8B-B14F-4D97-AF65-F5344CB8AC3E}">
+        <p14:creationId xmlns:p14="http://schemas.microsoft.com/office/powerpoint/2010/main" val="832436354"/>
+      </p:ext>
+    </p:extLst>
+  </p:cSld>
+  <p:clrMapOvr>
+    <a:masterClrMapping/>
+  </p:clrMapOvr>
+  <p:timing>
+    <p:tnLst>
+      <p:par>
+        <p:cTn id="1" dur="indefinite" restart="never" nodeType="tmRoot"/>
+      </p:par>
+    </p:tnLst>
+  </p:timing>
+</p:sld>
+</file>
+
+<file path=ppt/slides/slide9.xml><?xml version="1.0" encoding="utf-8"?>
+<p:sld xmlns:a="http://schemas.openxmlformats.org/drawingml/2006/main" xmlns:r="http://schemas.openxmlformats.org/officeDocument/2006/relationships" xmlns:p="http://schemas.openxmlformats.org/presentationml/2006/main">
+  <p:cSld>
+    <p:spTree>
+      <p:nvGrpSpPr>
+        <p:cNvPr id="1" name=""/>
+        <p:cNvGrpSpPr/>
+        <p:nvPr/>
+      </p:nvGrpSpPr>
+      <p:grpSpPr>
+        <a:xfrm>
+          <a:off x="0" y="0"/>
+          <a:ext cx="0" cy="0"/>
+          <a:chOff x="0" y="0"/>
+          <a:chExt cx="0" cy="0"/>
+        </a:xfrm>
+      </p:grpSpPr>
+      <p:sp>
+        <p:nvSpPr>
+          <p:cNvPr id="2" name="Title 1"/>
+          <p:cNvSpPr>
+            <a:spLocks noGrp="1"/>
+          </p:cNvSpPr>
+          <p:nvPr>
+            <p:ph type="title"/>
+          </p:nvPr>
+        </p:nvSpPr>
+        <p:spPr/>
+        <p:txBody>
+          <a:bodyPr/>
+          <a:lstStyle/>
+          <a:p>
+            <a:r>
+              <a:rPr lang="en-US" dirty="0" smtClean="0"/>
+              <a:t>Project </a:t>
+            </a:r>
+            <a:r>
+              <a:rPr lang="en-US" dirty="0" smtClean="0"/>
+              <a:t>Improvements</a:t>
             </a:r>
             <a:endParaRPr lang="en-US" dirty="0"/>
           </a:p>
@@ -5971,93 +6535,6 @@
     <p:extLst>
       <p:ext uri="{BB962C8B-B14F-4D97-AF65-F5344CB8AC3E}">
         <p14:creationId xmlns:p14="http://schemas.microsoft.com/office/powerpoint/2010/main" val="603301832"/>
-      </p:ext>
-    </p:extLst>
-  </p:cSld>
-  <p:clrMapOvr>
-    <a:masterClrMapping/>
-  </p:clrMapOvr>
-  <p:timing>
-    <p:tnLst>
-      <p:par>
-        <p:cTn id="1" dur="indefinite" restart="never" nodeType="tmRoot"/>
-      </p:par>
-    </p:tnLst>
-  </p:timing>
-</p:sld>
-</file>
-
-<file path=ppt/slides/slide9.xml><?xml version="1.0" encoding="utf-8"?>
-<p:sld xmlns:a="http://schemas.openxmlformats.org/drawingml/2006/main" xmlns:r="http://schemas.openxmlformats.org/officeDocument/2006/relationships" xmlns:p="http://schemas.openxmlformats.org/presentationml/2006/main">
-  <p:cSld>
-    <p:spTree>
-      <p:nvGrpSpPr>
-        <p:cNvPr id="1" name=""/>
-        <p:cNvGrpSpPr/>
-        <p:nvPr/>
-      </p:nvGrpSpPr>
-      <p:grpSpPr>
-        <a:xfrm>
-          <a:off x="0" y="0"/>
-          <a:ext cx="0" cy="0"/>
-          <a:chOff x="0" y="0"/>
-          <a:chExt cx="0" cy="0"/>
-        </a:xfrm>
-      </p:grpSpPr>
-      <p:sp>
-        <p:nvSpPr>
-          <p:cNvPr id="2" name="Title 1"/>
-          <p:cNvSpPr>
-            <a:spLocks noGrp="1"/>
-          </p:cNvSpPr>
-          <p:nvPr>
-            <p:ph type="title"/>
-          </p:nvPr>
-        </p:nvSpPr>
-        <p:spPr/>
-        <p:txBody>
-          <a:bodyPr/>
-          <a:lstStyle/>
-          <a:p>
-            <a:r>
-              <a:rPr lang="es-ES" dirty="0" err="1" smtClean="0"/>
-              <a:t>Camshift</a:t>
-            </a:r>
-            <a:r>
-              <a:rPr lang="es-ES" dirty="0" smtClean="0"/>
-              <a:t>  </a:t>
-            </a:r>
-            <a:r>
-              <a:rPr lang="es-ES" dirty="0" err="1" smtClean="0"/>
-              <a:t>explanation</a:t>
-            </a:r>
-            <a:endParaRPr lang="es-ES" dirty="0"/>
-          </a:p>
-        </p:txBody>
-      </p:sp>
-      <p:sp>
-        <p:nvSpPr>
-          <p:cNvPr id="3" name="Content Placeholder 2"/>
-          <p:cNvSpPr>
-            <a:spLocks noGrp="1"/>
-          </p:cNvSpPr>
-          <p:nvPr>
-            <p:ph idx="1"/>
-          </p:nvPr>
-        </p:nvSpPr>
-        <p:spPr/>
-        <p:txBody>
-          <a:bodyPr/>
-          <a:lstStyle/>
-          <a:p>
-            <a:endParaRPr lang="es-ES"/>
-          </a:p>
-        </p:txBody>
-      </p:sp>
-    </p:spTree>
-    <p:extLst>
-      <p:ext uri="{BB962C8B-B14F-4D97-AF65-F5344CB8AC3E}">
-        <p14:creationId xmlns:p14="http://schemas.microsoft.com/office/powerpoint/2010/main" val="1976494236"/>
       </p:ext>
     </p:extLst>
   </p:cSld>

</xml_diff>